<commit_message>
Extracted the lock map entry key to a constant.
</commit_message>
<xml_diff>
--- a/images/Source for images.pptx
+++ b/images/Source for images.pptx
@@ -6,6 +6,8 @@
   </p:sldMasterIdLst>
   <p:sldIdLst>
     <p:sldId id="256" r:id="rId2"/>
+    <p:sldId id="257" r:id="rId3"/>
+    <p:sldId id="258" r:id="rId4"/>
   </p:sldIdLst>
   <p:sldSz cx="12192000" cy="6858000"/>
   <p:notesSz cx="6858000" cy="9144000"/>
@@ -104,6 +106,11 @@
       </a:defRPr>
     </a:lvl9pPr>
   </p:defaultTextStyle>
+  <p:extLst>
+    <p:ext uri="{EFAFB233-063F-42B5-8137-9DF3F51BA10A}">
+      <p15:sldGuideLst xmlns:p15="http://schemas.microsoft.com/office/powerpoint/2012/main"/>
+    </p:ext>
+  </p:extLst>
 </p:presentation>
 </file>
 
@@ -254,7 +261,7 @@
           <a:p>
             <a:fld id="{41BED3F2-AD42-6C4F-845A-90BAE70CD334}" type="datetimeFigureOut">
               <a:rPr lang="en-US" smtClean="0"/>
-              <a:t>3/23/20</a:t>
+              <a:t>5/3/20</a:t>
             </a:fld>
             <a:endParaRPr lang="en-US"/>
           </a:p>
@@ -452,7 +459,7 @@
           <a:p>
             <a:fld id="{41BED3F2-AD42-6C4F-845A-90BAE70CD334}" type="datetimeFigureOut">
               <a:rPr lang="en-US" smtClean="0"/>
-              <a:t>3/23/20</a:t>
+              <a:t>5/3/20</a:t>
             </a:fld>
             <a:endParaRPr lang="en-US"/>
           </a:p>
@@ -660,7 +667,7 @@
           <a:p>
             <a:fld id="{41BED3F2-AD42-6C4F-845A-90BAE70CD334}" type="datetimeFigureOut">
               <a:rPr lang="en-US" smtClean="0"/>
-              <a:t>3/23/20</a:t>
+              <a:t>5/3/20</a:t>
             </a:fld>
             <a:endParaRPr lang="en-US"/>
           </a:p>
@@ -858,7 +865,7 @@
           <a:p>
             <a:fld id="{41BED3F2-AD42-6C4F-845A-90BAE70CD334}" type="datetimeFigureOut">
               <a:rPr lang="en-US" smtClean="0"/>
-              <a:t>3/23/20</a:t>
+              <a:t>5/3/20</a:t>
             </a:fld>
             <a:endParaRPr lang="en-US"/>
           </a:p>
@@ -1133,7 +1140,7 @@
           <a:p>
             <a:fld id="{41BED3F2-AD42-6C4F-845A-90BAE70CD334}" type="datetimeFigureOut">
               <a:rPr lang="en-US" smtClean="0"/>
-              <a:t>3/23/20</a:t>
+              <a:t>5/3/20</a:t>
             </a:fld>
             <a:endParaRPr lang="en-US"/>
           </a:p>
@@ -1398,7 +1405,7 @@
           <a:p>
             <a:fld id="{41BED3F2-AD42-6C4F-845A-90BAE70CD334}" type="datetimeFigureOut">
               <a:rPr lang="en-US" smtClean="0"/>
-              <a:t>3/23/20</a:t>
+              <a:t>5/3/20</a:t>
             </a:fld>
             <a:endParaRPr lang="en-US"/>
           </a:p>
@@ -1810,7 +1817,7 @@
           <a:p>
             <a:fld id="{41BED3F2-AD42-6C4F-845A-90BAE70CD334}" type="datetimeFigureOut">
               <a:rPr lang="en-US" smtClean="0"/>
-              <a:t>3/23/20</a:t>
+              <a:t>5/3/20</a:t>
             </a:fld>
             <a:endParaRPr lang="en-US"/>
           </a:p>
@@ -1951,7 +1958,7 @@
           <a:p>
             <a:fld id="{41BED3F2-AD42-6C4F-845A-90BAE70CD334}" type="datetimeFigureOut">
               <a:rPr lang="en-US" smtClean="0"/>
-              <a:t>3/23/20</a:t>
+              <a:t>5/3/20</a:t>
             </a:fld>
             <a:endParaRPr lang="en-US"/>
           </a:p>
@@ -2064,7 +2071,7 @@
           <a:p>
             <a:fld id="{41BED3F2-AD42-6C4F-845A-90BAE70CD334}" type="datetimeFigureOut">
               <a:rPr lang="en-US" smtClean="0"/>
-              <a:t>3/23/20</a:t>
+              <a:t>5/3/20</a:t>
             </a:fld>
             <a:endParaRPr lang="en-US"/>
           </a:p>
@@ -2375,7 +2382,7 @@
           <a:p>
             <a:fld id="{41BED3F2-AD42-6C4F-845A-90BAE70CD334}" type="datetimeFigureOut">
               <a:rPr lang="en-US" smtClean="0"/>
-              <a:t>3/23/20</a:t>
+              <a:t>5/3/20</a:t>
             </a:fld>
             <a:endParaRPr lang="en-US"/>
           </a:p>
@@ -2663,7 +2670,7 @@
           <a:p>
             <a:fld id="{41BED3F2-AD42-6C4F-845A-90BAE70CD334}" type="datetimeFigureOut">
               <a:rPr lang="en-US" smtClean="0"/>
-              <a:t>3/23/20</a:t>
+              <a:t>5/3/20</a:t>
             </a:fld>
             <a:endParaRPr lang="en-US"/>
           </a:p>
@@ -2904,7 +2911,7 @@
           <a:p>
             <a:fld id="{41BED3F2-AD42-6C4F-845A-90BAE70CD334}" type="datetimeFigureOut">
               <a:rPr lang="en-US" smtClean="0"/>
-              <a:t>3/23/20</a:t>
+              <a:t>5/3/20</a:t>
             </a:fld>
             <a:endParaRPr lang="en-US"/>
           </a:p>
@@ -4390,6 +4397,2335 @@
 </p:sld>
 </file>
 
+<file path=ppt/slides/slide2.xml><?xml version="1.0" encoding="utf-8"?>
+<p:sld xmlns:a="http://schemas.openxmlformats.org/drawingml/2006/main" xmlns:r="http://schemas.openxmlformats.org/officeDocument/2006/relationships" xmlns:p="http://schemas.openxmlformats.org/presentationml/2006/main">
+  <p:cSld>
+    <p:spTree>
+      <p:nvGrpSpPr>
+        <p:cNvPr id="1" name=""/>
+        <p:cNvGrpSpPr/>
+        <p:nvPr/>
+      </p:nvGrpSpPr>
+      <p:grpSpPr>
+        <a:xfrm>
+          <a:off x="0" y="0"/>
+          <a:ext cx="0" cy="0"/>
+          <a:chOff x="0" y="0"/>
+          <a:chExt cx="0" cy="0"/>
+        </a:xfrm>
+      </p:grpSpPr>
+      <p:grpSp>
+        <p:nvGrpSpPr>
+          <p:cNvPr id="6" name="Group 5">
+            <a:extLst>
+              <a:ext uri="{FF2B5EF4-FFF2-40B4-BE49-F238E27FC236}">
+                <a16:creationId xmlns:a16="http://schemas.microsoft.com/office/drawing/2014/main" id="{FB2612DD-A76A-6446-8AA5-E9B72669B377}"/>
+              </a:ext>
+            </a:extLst>
+          </p:cNvPr>
+          <p:cNvGrpSpPr/>
+          <p:nvPr/>
+        </p:nvGrpSpPr>
+        <p:grpSpPr>
+          <a:xfrm>
+            <a:off x="391385" y="2892382"/>
+            <a:ext cx="2663687" cy="923330"/>
+            <a:chOff x="1083364" y="475494"/>
+            <a:chExt cx="2663687" cy="923330"/>
+          </a:xfrm>
+        </p:grpSpPr>
+        <p:sp>
+          <p:nvSpPr>
+            <p:cNvPr id="4" name="TextBox 3">
+              <a:extLst>
+                <a:ext uri="{FF2B5EF4-FFF2-40B4-BE49-F238E27FC236}">
+                  <a16:creationId xmlns:a16="http://schemas.microsoft.com/office/drawing/2014/main" id="{DEE2DC9A-5A65-0647-9436-0FB2B3A745DE}"/>
+                </a:ext>
+              </a:extLst>
+            </p:cNvPr>
+            <p:cNvSpPr txBox="1"/>
+            <p:nvPr/>
+          </p:nvSpPr>
+          <p:spPr>
+            <a:xfrm>
+              <a:off x="1083364" y="844826"/>
+              <a:ext cx="2663687" cy="553998"/>
+            </a:xfrm>
+            <a:prstGeom prst="rect">
+              <a:avLst/>
+            </a:prstGeom>
+            <a:noFill/>
+            <a:ln>
+              <a:solidFill>
+                <a:schemeClr val="tx1"/>
+              </a:solidFill>
+            </a:ln>
+          </p:spPr>
+          <p:txBody>
+            <a:bodyPr wrap="square" rtlCol="0">
+              <a:spAutoFit/>
+            </a:bodyPr>
+            <a:lstStyle/>
+            <a:p>
+              <a:r>
+                <a:rPr lang="en-US" sz="1000" dirty="0"/>
+                <a:t>{</a:t>
+              </a:r>
+            </a:p>
+            <a:p>
+              <a:r>
+                <a:rPr lang="en-US" sz="1000"/>
+                <a:t>}</a:t>
+              </a:r>
+              <a:endParaRPr lang="en-US" sz="1000" dirty="0"/>
+            </a:p>
+            <a:p>
+              <a:r>
+                <a:rPr lang="en-US" sz="1000" dirty="0"/>
+                <a:t>Bitmap: 0000 0101</a:t>
+              </a:r>
+            </a:p>
+          </p:txBody>
+        </p:sp>
+        <p:sp>
+          <p:nvSpPr>
+            <p:cNvPr id="5" name="TextBox 4">
+              <a:extLst>
+                <a:ext uri="{FF2B5EF4-FFF2-40B4-BE49-F238E27FC236}">
+                  <a16:creationId xmlns:a16="http://schemas.microsoft.com/office/drawing/2014/main" id="{FAA13739-42E4-2046-A079-7E5B1A3BD4E4}"/>
+                </a:ext>
+              </a:extLst>
+            </p:cNvPr>
+            <p:cNvSpPr txBox="1"/>
+            <p:nvPr/>
+          </p:nvSpPr>
+          <p:spPr>
+            <a:xfrm>
+              <a:off x="1083364" y="475494"/>
+              <a:ext cx="2663687" cy="369332"/>
+            </a:xfrm>
+            <a:prstGeom prst="rect">
+              <a:avLst/>
+            </a:prstGeom>
+            <a:noFill/>
+            <a:ln>
+              <a:solidFill>
+                <a:schemeClr val="tx1"/>
+              </a:solidFill>
+            </a:ln>
+          </p:spPr>
+          <p:txBody>
+            <a:bodyPr wrap="square" rtlCol="0">
+              <a:spAutoFit/>
+            </a:bodyPr>
+            <a:lstStyle/>
+            <a:p>
+              <a:r>
+                <a:rPr lang="en-US" i="1" dirty="0"/>
+                <a:t>&lt;</a:t>
+              </a:r>
+              <a:r>
+                <a:rPr lang="en-US" i="1" dirty="0" err="1"/>
+                <a:t>Cust_id</a:t>
+              </a:r>
+              <a:r>
+                <a:rPr lang="en-US" i="1" dirty="0"/>
+                <a:t>&gt;:&lt;date&gt;</a:t>
+              </a:r>
+            </a:p>
+          </p:txBody>
+        </p:sp>
+      </p:grpSp>
+      <p:grpSp>
+        <p:nvGrpSpPr>
+          <p:cNvPr id="7" name="Group 6">
+            <a:extLst>
+              <a:ext uri="{FF2B5EF4-FFF2-40B4-BE49-F238E27FC236}">
+                <a16:creationId xmlns:a16="http://schemas.microsoft.com/office/drawing/2014/main" id="{E56B8153-EF17-134B-B729-3DAAAB2CA5AF}"/>
+              </a:ext>
+            </a:extLst>
+          </p:cNvPr>
+          <p:cNvGrpSpPr/>
+          <p:nvPr/>
+        </p:nvGrpSpPr>
+        <p:grpSpPr>
+          <a:xfrm>
+            <a:off x="4220815" y="1815164"/>
+            <a:ext cx="2663687" cy="1384995"/>
+            <a:chOff x="1083364" y="475494"/>
+            <a:chExt cx="2663687" cy="1384995"/>
+          </a:xfrm>
+        </p:grpSpPr>
+        <p:sp>
+          <p:nvSpPr>
+            <p:cNvPr id="8" name="TextBox 7">
+              <a:extLst>
+                <a:ext uri="{FF2B5EF4-FFF2-40B4-BE49-F238E27FC236}">
+                  <a16:creationId xmlns:a16="http://schemas.microsoft.com/office/drawing/2014/main" id="{060C17B8-1464-FA47-A346-3BE87B181C50}"/>
+                </a:ext>
+              </a:extLst>
+            </p:cNvPr>
+            <p:cNvSpPr txBox="1"/>
+            <p:nvPr/>
+          </p:nvSpPr>
+          <p:spPr>
+            <a:xfrm>
+              <a:off x="1083364" y="844826"/>
+              <a:ext cx="2663687" cy="1015663"/>
+            </a:xfrm>
+            <a:prstGeom prst="rect">
+              <a:avLst/>
+            </a:prstGeom>
+            <a:noFill/>
+            <a:ln>
+              <a:solidFill>
+                <a:schemeClr val="tx1"/>
+              </a:solidFill>
+            </a:ln>
+          </p:spPr>
+          <p:txBody>
+            <a:bodyPr wrap="square" rtlCol="0">
+              <a:spAutoFit/>
+            </a:bodyPr>
+            <a:lstStyle/>
+            <a:p>
+              <a:r>
+                <a:rPr lang="en-US" sz="1000" dirty="0"/>
+                <a:t>{</a:t>
+              </a:r>
+            </a:p>
+            <a:p>
+              <a:r>
+                <a:rPr lang="en-US" sz="1000" dirty="0"/>
+                <a:t>    txn2 -&gt; { </a:t>
+              </a:r>
+              <a:r>
+                <a:rPr lang="en-US" sz="1000" dirty="0" err="1"/>
+                <a:t>Txn</a:t>
+              </a:r>
+              <a:r>
+                <a:rPr lang="en-US" sz="1000" dirty="0"/>
+                <a:t> Record } Digest: 1011 0010</a:t>
+              </a:r>
+            </a:p>
+            <a:p>
+              <a:r>
+                <a:rPr lang="en-US" sz="1000" dirty="0"/>
+                <a:t>    txn5 -&gt; { </a:t>
+              </a:r>
+              <a:r>
+                <a:rPr lang="en-US" sz="1000" dirty="0" err="1"/>
+                <a:t>Txn</a:t>
+              </a:r>
+              <a:r>
+                <a:rPr lang="en-US" sz="1000" dirty="0"/>
+                <a:t> Record } Digest: 1110 1000</a:t>
+              </a:r>
+            </a:p>
+            <a:p>
+              <a:r>
+                <a:rPr lang="en-US" sz="1000" dirty="0"/>
+                <a:t>    txn8 -&gt; { </a:t>
+              </a:r>
+              <a:r>
+                <a:rPr lang="en-US" sz="1000" dirty="0" err="1"/>
+                <a:t>Txn</a:t>
+              </a:r>
+              <a:r>
+                <a:rPr lang="en-US" sz="1000" dirty="0"/>
+                <a:t> Record } Digest: 0110 0100</a:t>
+              </a:r>
+            </a:p>
+            <a:p>
+              <a:r>
+                <a:rPr lang="en-US" sz="1000" dirty="0"/>
+                <a:t>    txn10 -&gt; { </a:t>
+              </a:r>
+              <a:r>
+                <a:rPr lang="en-US" sz="1000" dirty="0" err="1"/>
+                <a:t>Txn</a:t>
+              </a:r>
+              <a:r>
+                <a:rPr lang="en-US" sz="1000" dirty="0"/>
+                <a:t> Record } Digest: 0010 0000</a:t>
+              </a:r>
+            </a:p>
+            <a:p>
+              <a:r>
+                <a:rPr lang="en-US" sz="1000" dirty="0"/>
+                <a:t>}</a:t>
+              </a:r>
+            </a:p>
+          </p:txBody>
+        </p:sp>
+        <p:sp>
+          <p:nvSpPr>
+            <p:cNvPr id="9" name="TextBox 8">
+              <a:extLst>
+                <a:ext uri="{FF2B5EF4-FFF2-40B4-BE49-F238E27FC236}">
+                  <a16:creationId xmlns:a16="http://schemas.microsoft.com/office/drawing/2014/main" id="{7F28AA47-26F7-DB45-B1AE-2A316FDA309B}"/>
+                </a:ext>
+              </a:extLst>
+            </p:cNvPr>
+            <p:cNvSpPr txBox="1"/>
+            <p:nvPr/>
+          </p:nvSpPr>
+          <p:spPr>
+            <a:xfrm>
+              <a:off x="1083364" y="475494"/>
+              <a:ext cx="2663687" cy="369332"/>
+            </a:xfrm>
+            <a:prstGeom prst="rect">
+              <a:avLst/>
+            </a:prstGeom>
+            <a:noFill/>
+            <a:ln>
+              <a:solidFill>
+                <a:schemeClr val="tx1"/>
+              </a:solidFill>
+            </a:ln>
+          </p:spPr>
+          <p:txBody>
+            <a:bodyPr wrap="square" rtlCol="0">
+              <a:spAutoFit/>
+            </a:bodyPr>
+            <a:lstStyle/>
+            <a:p>
+              <a:r>
+                <a:rPr lang="en-US" i="1" dirty="0"/>
+                <a:t>&lt;</a:t>
+              </a:r>
+              <a:r>
+                <a:rPr lang="en-US" i="1" dirty="0" err="1"/>
+                <a:t>Cust_id</a:t>
+              </a:r>
+              <a:r>
+                <a:rPr lang="en-US" i="1" dirty="0"/>
+                <a:t>&gt;:&lt;date&gt; :1</a:t>
+              </a:r>
+            </a:p>
+          </p:txBody>
+        </p:sp>
+      </p:grpSp>
+      <p:grpSp>
+        <p:nvGrpSpPr>
+          <p:cNvPr id="10" name="Group 9">
+            <a:extLst>
+              <a:ext uri="{FF2B5EF4-FFF2-40B4-BE49-F238E27FC236}">
+                <a16:creationId xmlns:a16="http://schemas.microsoft.com/office/drawing/2014/main" id="{7F221EAD-578E-D344-A706-BF36D327B3CA}"/>
+              </a:ext>
+            </a:extLst>
+          </p:cNvPr>
+          <p:cNvGrpSpPr/>
+          <p:nvPr/>
+        </p:nvGrpSpPr>
+        <p:grpSpPr>
+          <a:xfrm>
+            <a:off x="4230218" y="3486424"/>
+            <a:ext cx="2663687" cy="1231106"/>
+            <a:chOff x="1083364" y="475494"/>
+            <a:chExt cx="2663687" cy="1231106"/>
+          </a:xfrm>
+        </p:grpSpPr>
+        <p:sp>
+          <p:nvSpPr>
+            <p:cNvPr id="11" name="TextBox 10">
+              <a:extLst>
+                <a:ext uri="{FF2B5EF4-FFF2-40B4-BE49-F238E27FC236}">
+                  <a16:creationId xmlns:a16="http://schemas.microsoft.com/office/drawing/2014/main" id="{9F214698-0C7B-A44F-B198-7377313A3A64}"/>
+                </a:ext>
+              </a:extLst>
+            </p:cNvPr>
+            <p:cNvSpPr txBox="1"/>
+            <p:nvPr/>
+          </p:nvSpPr>
+          <p:spPr>
+            <a:xfrm>
+              <a:off x="1083364" y="844826"/>
+              <a:ext cx="2663687" cy="861774"/>
+            </a:xfrm>
+            <a:prstGeom prst="rect">
+              <a:avLst/>
+            </a:prstGeom>
+            <a:noFill/>
+            <a:ln>
+              <a:solidFill>
+                <a:schemeClr val="tx1"/>
+              </a:solidFill>
+              <a:prstDash val="sysDash"/>
+            </a:ln>
+          </p:spPr>
+          <p:txBody>
+            <a:bodyPr wrap="square" rtlCol="0">
+              <a:spAutoFit/>
+            </a:bodyPr>
+            <a:lstStyle/>
+            <a:p>
+              <a:r>
+                <a:rPr lang="en-US" sz="1000" dirty="0">
+                  <a:solidFill>
+                    <a:schemeClr val="bg1">
+                      <a:lumMod val="85000"/>
+                    </a:schemeClr>
+                  </a:solidFill>
+                </a:rPr>
+                <a:t>{</a:t>
+              </a:r>
+            </a:p>
+            <a:p>
+              <a:r>
+                <a:rPr lang="en-US" sz="1000" dirty="0">
+                  <a:solidFill>
+                    <a:schemeClr val="bg1">
+                      <a:lumMod val="85000"/>
+                    </a:schemeClr>
+                  </a:solidFill>
+                </a:rPr>
+                <a:t>    1. Tim -&gt; { Tim Record } Digest: 1111 0001</a:t>
+              </a:r>
+            </a:p>
+            <a:p>
+              <a:r>
+                <a:rPr lang="en-US" sz="1000" dirty="0">
+                  <a:solidFill>
+                    <a:schemeClr val="bg1">
+                      <a:lumMod val="85000"/>
+                    </a:schemeClr>
+                  </a:solidFill>
+                </a:rPr>
+                <a:t>    3. Sue -&gt; { Sue Record } Digest: 1001 0011</a:t>
+              </a:r>
+            </a:p>
+            <a:p>
+              <a:r>
+                <a:rPr lang="en-US" sz="1000" dirty="0">
+                  <a:solidFill>
+                    <a:schemeClr val="bg1">
+                      <a:lumMod val="85000"/>
+                    </a:schemeClr>
+                  </a:solidFill>
+                </a:rPr>
+                <a:t>    4. Tom -&gt; { Tom Record } Digest: 0100 0011</a:t>
+              </a:r>
+            </a:p>
+            <a:p>
+              <a:r>
+                <a:rPr lang="en-US" sz="1000" dirty="0">
+                  <a:solidFill>
+                    <a:schemeClr val="bg1">
+                      <a:lumMod val="85000"/>
+                    </a:schemeClr>
+                  </a:solidFill>
+                </a:rPr>
+                <a:t>}</a:t>
+              </a:r>
+            </a:p>
+          </p:txBody>
+        </p:sp>
+        <p:sp>
+          <p:nvSpPr>
+            <p:cNvPr id="12" name="TextBox 11">
+              <a:extLst>
+                <a:ext uri="{FF2B5EF4-FFF2-40B4-BE49-F238E27FC236}">
+                  <a16:creationId xmlns:a16="http://schemas.microsoft.com/office/drawing/2014/main" id="{53F655BD-8EEF-2A47-B957-821F84D220AE}"/>
+                </a:ext>
+              </a:extLst>
+            </p:cNvPr>
+            <p:cNvSpPr txBox="1"/>
+            <p:nvPr/>
+          </p:nvSpPr>
+          <p:spPr>
+            <a:xfrm>
+              <a:off x="1083364" y="475494"/>
+              <a:ext cx="2663687" cy="369332"/>
+            </a:xfrm>
+            <a:prstGeom prst="rect">
+              <a:avLst/>
+            </a:prstGeom>
+            <a:noFill/>
+            <a:ln>
+              <a:solidFill>
+                <a:schemeClr val="tx1"/>
+              </a:solidFill>
+              <a:prstDash val="sysDash"/>
+            </a:ln>
+          </p:spPr>
+          <p:txBody>
+            <a:bodyPr wrap="square" rtlCol="0">
+              <a:spAutoFit/>
+            </a:bodyPr>
+            <a:lstStyle/>
+            <a:p>
+              <a:r>
+                <a:rPr lang="en-US" i="1" dirty="0">
+                  <a:solidFill>
+                    <a:schemeClr val="bg1">
+                      <a:lumMod val="85000"/>
+                    </a:schemeClr>
+                  </a:solidFill>
+                </a:rPr>
+                <a:t>TestKey:2</a:t>
+              </a:r>
+            </a:p>
+          </p:txBody>
+        </p:sp>
+      </p:grpSp>
+      <p:cxnSp>
+        <p:nvCxnSpPr>
+          <p:cNvPr id="14" name="Elbow Connector 13">
+            <a:extLst>
+              <a:ext uri="{FF2B5EF4-FFF2-40B4-BE49-F238E27FC236}">
+                <a16:creationId xmlns:a16="http://schemas.microsoft.com/office/drawing/2014/main" id="{ACF1419A-B621-5140-8275-76991069C10A}"/>
+              </a:ext>
+            </a:extLst>
+          </p:cNvPr>
+          <p:cNvCxnSpPr>
+            <a:stCxn id="4" idx="3"/>
+            <a:endCxn id="11" idx="1"/>
+          </p:cNvCxnSpPr>
+          <p:nvPr/>
+        </p:nvCxnSpPr>
+        <p:spPr>
+          <a:xfrm>
+            <a:off x="3055072" y="3538713"/>
+            <a:ext cx="1175146" cy="747930"/>
+          </a:xfrm>
+          <a:prstGeom prst="curvedConnector3">
+            <a:avLst/>
+          </a:prstGeom>
+          <a:ln>
+            <a:solidFill>
+              <a:schemeClr val="tx1"/>
+            </a:solidFill>
+            <a:tailEnd type="triangle"/>
+          </a:ln>
+        </p:spPr>
+        <p:style>
+          <a:lnRef idx="1">
+            <a:schemeClr val="accent1"/>
+          </a:lnRef>
+          <a:fillRef idx="0">
+            <a:schemeClr val="accent1"/>
+          </a:fillRef>
+          <a:effectRef idx="0">
+            <a:schemeClr val="accent1"/>
+          </a:effectRef>
+          <a:fontRef idx="minor">
+            <a:schemeClr val="tx1"/>
+          </a:fontRef>
+        </p:style>
+      </p:cxnSp>
+      <p:cxnSp>
+        <p:nvCxnSpPr>
+          <p:cNvPr id="15" name="Elbow Connector 13">
+            <a:extLst>
+              <a:ext uri="{FF2B5EF4-FFF2-40B4-BE49-F238E27FC236}">
+                <a16:creationId xmlns:a16="http://schemas.microsoft.com/office/drawing/2014/main" id="{98E4ADF3-1A6D-3844-AD22-1F2E2E697A44}"/>
+              </a:ext>
+            </a:extLst>
+          </p:cNvPr>
+          <p:cNvCxnSpPr>
+            <a:cxnSpLocks/>
+            <a:stCxn id="5" idx="3"/>
+            <a:endCxn id="8" idx="1"/>
+          </p:cNvCxnSpPr>
+          <p:nvPr/>
+        </p:nvCxnSpPr>
+        <p:spPr>
+          <a:xfrm flipV="1">
+            <a:off x="3055072" y="2692328"/>
+            <a:ext cx="1165743" cy="384720"/>
+          </a:xfrm>
+          <a:prstGeom prst="curvedConnector3">
+            <a:avLst>
+              <a:gd name="adj1" fmla="val 50000"/>
+            </a:avLst>
+          </a:prstGeom>
+          <a:ln>
+            <a:solidFill>
+              <a:schemeClr val="tx1"/>
+            </a:solidFill>
+            <a:tailEnd type="triangle"/>
+          </a:ln>
+        </p:spPr>
+        <p:style>
+          <a:lnRef idx="1">
+            <a:schemeClr val="accent1"/>
+          </a:lnRef>
+          <a:fillRef idx="0">
+            <a:schemeClr val="accent1"/>
+          </a:fillRef>
+          <a:effectRef idx="0">
+            <a:schemeClr val="accent1"/>
+          </a:effectRef>
+          <a:fontRef idx="minor">
+            <a:schemeClr val="tx1"/>
+          </a:fontRef>
+        </p:style>
+      </p:cxnSp>
+      <p:grpSp>
+        <p:nvGrpSpPr>
+          <p:cNvPr id="18" name="Group 17">
+            <a:extLst>
+              <a:ext uri="{FF2B5EF4-FFF2-40B4-BE49-F238E27FC236}">
+                <a16:creationId xmlns:a16="http://schemas.microsoft.com/office/drawing/2014/main" id="{57A85072-46B8-E648-82EC-94B28AFE1842}"/>
+              </a:ext>
+            </a:extLst>
+          </p:cNvPr>
+          <p:cNvGrpSpPr/>
+          <p:nvPr/>
+        </p:nvGrpSpPr>
+        <p:grpSpPr>
+          <a:xfrm>
+            <a:off x="7961784" y="2892382"/>
+            <a:ext cx="2663687" cy="1231106"/>
+            <a:chOff x="1083364" y="475494"/>
+            <a:chExt cx="2663687" cy="1231106"/>
+          </a:xfrm>
+        </p:grpSpPr>
+        <p:sp>
+          <p:nvSpPr>
+            <p:cNvPr id="19" name="TextBox 18">
+              <a:extLst>
+                <a:ext uri="{FF2B5EF4-FFF2-40B4-BE49-F238E27FC236}">
+                  <a16:creationId xmlns:a16="http://schemas.microsoft.com/office/drawing/2014/main" id="{AF64A7AB-AE82-BF49-B9D2-2561DB813DF4}"/>
+                </a:ext>
+              </a:extLst>
+            </p:cNvPr>
+            <p:cNvSpPr txBox="1"/>
+            <p:nvPr/>
+          </p:nvSpPr>
+          <p:spPr>
+            <a:xfrm>
+              <a:off x="1083364" y="844826"/>
+              <a:ext cx="2663687" cy="861774"/>
+            </a:xfrm>
+            <a:prstGeom prst="rect">
+              <a:avLst/>
+            </a:prstGeom>
+            <a:noFill/>
+            <a:ln>
+              <a:solidFill>
+                <a:schemeClr val="tx1"/>
+              </a:solidFill>
+            </a:ln>
+          </p:spPr>
+          <p:txBody>
+            <a:bodyPr wrap="square" rtlCol="0">
+              <a:spAutoFit/>
+            </a:bodyPr>
+            <a:lstStyle/>
+            <a:p>
+              <a:r>
+                <a:rPr lang="en-US" sz="1000" dirty="0"/>
+                <a:t>{</a:t>
+              </a:r>
+            </a:p>
+            <a:p>
+              <a:r>
+                <a:rPr lang="en-US" sz="1000" dirty="0"/>
+                <a:t>    txn1 -&gt; { </a:t>
+              </a:r>
+              <a:r>
+                <a:rPr lang="en-US" sz="1000" dirty="0" err="1"/>
+                <a:t>Txn</a:t>
+              </a:r>
+              <a:r>
+                <a:rPr lang="en-US" sz="1000" dirty="0"/>
+                <a:t> Record } Digest: 1111 0001</a:t>
+              </a:r>
+            </a:p>
+            <a:p>
+              <a:r>
+                <a:rPr lang="en-US" sz="1000" dirty="0"/>
+                <a:t>    txn6 -&gt; { </a:t>
+              </a:r>
+              <a:r>
+                <a:rPr lang="en-US" sz="1000" dirty="0" err="1"/>
+                <a:t>Txn</a:t>
+              </a:r>
+              <a:r>
+                <a:rPr lang="en-US" sz="1000" dirty="0"/>
+                <a:t> Record } Digest: 1010 1001</a:t>
+              </a:r>
+            </a:p>
+            <a:p>
+              <a:r>
+                <a:rPr lang="en-US" sz="1000" dirty="0"/>
+                <a:t>    txn9 -&gt; { </a:t>
+              </a:r>
+              <a:r>
+                <a:rPr lang="en-US" sz="1000" dirty="0" err="1"/>
+                <a:t>Txn</a:t>
+              </a:r>
+              <a:r>
+                <a:rPr lang="en-US" sz="1000" dirty="0"/>
+                <a:t> Record } Digest: 0110 0101</a:t>
+              </a:r>
+            </a:p>
+            <a:p>
+              <a:r>
+                <a:rPr lang="en-US" sz="1000" dirty="0"/>
+                <a:t>}</a:t>
+              </a:r>
+            </a:p>
+          </p:txBody>
+        </p:sp>
+        <p:sp>
+          <p:nvSpPr>
+            <p:cNvPr id="20" name="TextBox 19">
+              <a:extLst>
+                <a:ext uri="{FF2B5EF4-FFF2-40B4-BE49-F238E27FC236}">
+                  <a16:creationId xmlns:a16="http://schemas.microsoft.com/office/drawing/2014/main" id="{0FEABD17-3411-E446-B432-E5EC782AAA05}"/>
+                </a:ext>
+              </a:extLst>
+            </p:cNvPr>
+            <p:cNvSpPr txBox="1"/>
+            <p:nvPr/>
+          </p:nvSpPr>
+          <p:spPr>
+            <a:xfrm>
+              <a:off x="1083364" y="475494"/>
+              <a:ext cx="2663687" cy="369332"/>
+            </a:xfrm>
+            <a:prstGeom prst="rect">
+              <a:avLst/>
+            </a:prstGeom>
+            <a:noFill/>
+            <a:ln>
+              <a:solidFill>
+                <a:schemeClr val="tx1"/>
+              </a:solidFill>
+            </a:ln>
+          </p:spPr>
+          <p:txBody>
+            <a:bodyPr wrap="square" rtlCol="0">
+              <a:spAutoFit/>
+            </a:bodyPr>
+            <a:lstStyle/>
+            <a:p>
+              <a:r>
+                <a:rPr lang="en-US" i="1" dirty="0"/>
+                <a:t>&lt;</a:t>
+              </a:r>
+              <a:r>
+                <a:rPr lang="en-US" i="1" dirty="0" err="1"/>
+                <a:t>Cust_id</a:t>
+              </a:r>
+              <a:r>
+                <a:rPr lang="en-US" i="1" dirty="0"/>
+                <a:t>&gt;:&lt;date&gt; :5</a:t>
+              </a:r>
+            </a:p>
+          </p:txBody>
+        </p:sp>
+      </p:grpSp>
+      <p:grpSp>
+        <p:nvGrpSpPr>
+          <p:cNvPr id="21" name="Group 20">
+            <a:extLst>
+              <a:ext uri="{FF2B5EF4-FFF2-40B4-BE49-F238E27FC236}">
+                <a16:creationId xmlns:a16="http://schemas.microsoft.com/office/drawing/2014/main" id="{F1081A49-BF85-9240-A4DE-793C118C0005}"/>
+              </a:ext>
+            </a:extLst>
+          </p:cNvPr>
+          <p:cNvGrpSpPr/>
+          <p:nvPr/>
+        </p:nvGrpSpPr>
+        <p:grpSpPr>
+          <a:xfrm>
+            <a:off x="7961785" y="4433328"/>
+            <a:ext cx="2663687" cy="1231106"/>
+            <a:chOff x="1083364" y="475494"/>
+            <a:chExt cx="2663687" cy="1231106"/>
+          </a:xfrm>
+        </p:grpSpPr>
+        <p:sp>
+          <p:nvSpPr>
+            <p:cNvPr id="22" name="TextBox 21">
+              <a:extLst>
+                <a:ext uri="{FF2B5EF4-FFF2-40B4-BE49-F238E27FC236}">
+                  <a16:creationId xmlns:a16="http://schemas.microsoft.com/office/drawing/2014/main" id="{A7FB7E0F-CCC2-ED45-8EAD-5EF74FF44A21}"/>
+                </a:ext>
+              </a:extLst>
+            </p:cNvPr>
+            <p:cNvSpPr txBox="1"/>
+            <p:nvPr/>
+          </p:nvSpPr>
+          <p:spPr>
+            <a:xfrm>
+              <a:off x="1083364" y="844826"/>
+              <a:ext cx="2663687" cy="861774"/>
+            </a:xfrm>
+            <a:prstGeom prst="rect">
+              <a:avLst/>
+            </a:prstGeom>
+            <a:noFill/>
+            <a:ln>
+              <a:solidFill>
+                <a:schemeClr val="tx1"/>
+              </a:solidFill>
+            </a:ln>
+          </p:spPr>
+          <p:txBody>
+            <a:bodyPr wrap="square" rtlCol="0">
+              <a:spAutoFit/>
+            </a:bodyPr>
+            <a:lstStyle/>
+            <a:p>
+              <a:r>
+                <a:rPr lang="en-US" sz="1000" dirty="0"/>
+                <a:t>{</a:t>
+              </a:r>
+            </a:p>
+            <a:p>
+              <a:r>
+                <a:rPr lang="en-US" sz="1000" dirty="0"/>
+                <a:t>    txn3 -&gt; { </a:t>
+              </a:r>
+              <a:r>
+                <a:rPr lang="en-US" sz="1000" dirty="0" err="1"/>
+                <a:t>Txn</a:t>
+              </a:r>
+              <a:r>
+                <a:rPr lang="en-US" sz="1000" dirty="0"/>
+                <a:t> Record } Digest: 1001 0011</a:t>
+              </a:r>
+            </a:p>
+            <a:p>
+              <a:r>
+                <a:rPr lang="en-US" sz="1000" dirty="0"/>
+                <a:t>    txn4 -&gt; { </a:t>
+              </a:r>
+              <a:r>
+                <a:rPr lang="en-US" sz="1000" dirty="0" err="1"/>
+                <a:t>Txn</a:t>
+              </a:r>
+              <a:r>
+                <a:rPr lang="en-US" sz="1000" dirty="0"/>
+                <a:t> Record } Digest: 0100 0011</a:t>
+              </a:r>
+            </a:p>
+            <a:p>
+              <a:r>
+                <a:rPr lang="en-US" sz="1000" dirty="0"/>
+                <a:t>    txn7 -&gt; { </a:t>
+              </a:r>
+              <a:r>
+                <a:rPr lang="en-US" sz="1000" dirty="0" err="1"/>
+                <a:t>Txn</a:t>
+              </a:r>
+              <a:r>
+                <a:rPr lang="en-US" sz="1000" dirty="0"/>
+                <a:t> Record } Digest: 1110 0011</a:t>
+              </a:r>
+            </a:p>
+            <a:p>
+              <a:r>
+                <a:rPr lang="en-US" sz="1000" dirty="0"/>
+                <a:t>}</a:t>
+              </a:r>
+            </a:p>
+          </p:txBody>
+        </p:sp>
+        <p:sp>
+          <p:nvSpPr>
+            <p:cNvPr id="23" name="TextBox 22">
+              <a:extLst>
+                <a:ext uri="{FF2B5EF4-FFF2-40B4-BE49-F238E27FC236}">
+                  <a16:creationId xmlns:a16="http://schemas.microsoft.com/office/drawing/2014/main" id="{18478A3B-9C72-2C41-84E0-CAD8452F3113}"/>
+                </a:ext>
+              </a:extLst>
+            </p:cNvPr>
+            <p:cNvSpPr txBox="1"/>
+            <p:nvPr/>
+          </p:nvSpPr>
+          <p:spPr>
+            <a:xfrm>
+              <a:off x="1083364" y="475494"/>
+              <a:ext cx="2663687" cy="369332"/>
+            </a:xfrm>
+            <a:prstGeom prst="rect">
+              <a:avLst/>
+            </a:prstGeom>
+            <a:noFill/>
+            <a:ln>
+              <a:solidFill>
+                <a:schemeClr val="tx1"/>
+              </a:solidFill>
+            </a:ln>
+          </p:spPr>
+          <p:txBody>
+            <a:bodyPr wrap="square" rtlCol="0">
+              <a:spAutoFit/>
+            </a:bodyPr>
+            <a:lstStyle/>
+            <a:p>
+              <a:r>
+                <a:rPr lang="en-US" i="1" dirty="0"/>
+                <a:t>&lt;</a:t>
+              </a:r>
+              <a:r>
+                <a:rPr lang="en-US" i="1" dirty="0" err="1"/>
+                <a:t>Cust_id</a:t>
+              </a:r>
+              <a:r>
+                <a:rPr lang="en-US" i="1" dirty="0"/>
+                <a:t>&gt;:&lt;date&gt; :6</a:t>
+              </a:r>
+            </a:p>
+          </p:txBody>
+        </p:sp>
+      </p:grpSp>
+      <p:cxnSp>
+        <p:nvCxnSpPr>
+          <p:cNvPr id="24" name="Elbow Connector 13">
+            <a:extLst>
+              <a:ext uri="{FF2B5EF4-FFF2-40B4-BE49-F238E27FC236}">
+                <a16:creationId xmlns:a16="http://schemas.microsoft.com/office/drawing/2014/main" id="{24E6D724-171B-8E4F-BAD5-BCFB4CEE7310}"/>
+              </a:ext>
+            </a:extLst>
+          </p:cNvPr>
+          <p:cNvCxnSpPr>
+            <a:cxnSpLocks/>
+            <a:endCxn id="22" idx="1"/>
+          </p:cNvCxnSpPr>
+          <p:nvPr/>
+        </p:nvCxnSpPr>
+        <p:spPr>
+          <a:xfrm>
+            <a:off x="6893905" y="4307463"/>
+            <a:ext cx="1067880" cy="926084"/>
+          </a:xfrm>
+          <a:prstGeom prst="curvedConnector3">
+            <a:avLst/>
+          </a:prstGeom>
+          <a:ln>
+            <a:solidFill>
+              <a:schemeClr val="tx1"/>
+            </a:solidFill>
+            <a:tailEnd type="triangle"/>
+          </a:ln>
+        </p:spPr>
+        <p:style>
+          <a:lnRef idx="1">
+            <a:schemeClr val="accent1"/>
+          </a:lnRef>
+          <a:fillRef idx="0">
+            <a:schemeClr val="accent1"/>
+          </a:fillRef>
+          <a:effectRef idx="0">
+            <a:schemeClr val="accent1"/>
+          </a:effectRef>
+          <a:fontRef idx="minor">
+            <a:schemeClr val="tx1"/>
+          </a:fontRef>
+        </p:style>
+      </p:cxnSp>
+      <p:cxnSp>
+        <p:nvCxnSpPr>
+          <p:cNvPr id="26" name="Elbow Connector 13">
+            <a:extLst>
+              <a:ext uri="{FF2B5EF4-FFF2-40B4-BE49-F238E27FC236}">
+                <a16:creationId xmlns:a16="http://schemas.microsoft.com/office/drawing/2014/main" id="{61328EF1-F7B4-7040-94FB-9E0A5AB3F4DD}"/>
+              </a:ext>
+            </a:extLst>
+          </p:cNvPr>
+          <p:cNvCxnSpPr>
+            <a:cxnSpLocks/>
+            <a:endCxn id="19" idx="1"/>
+          </p:cNvCxnSpPr>
+          <p:nvPr/>
+        </p:nvCxnSpPr>
+        <p:spPr>
+          <a:xfrm flipV="1">
+            <a:off x="6893905" y="3692601"/>
+            <a:ext cx="1067879" cy="353945"/>
+          </a:xfrm>
+          <a:prstGeom prst="curvedConnector3">
+            <a:avLst>
+              <a:gd name="adj1" fmla="val 50000"/>
+            </a:avLst>
+          </a:prstGeom>
+          <a:ln>
+            <a:solidFill>
+              <a:schemeClr val="tx1"/>
+            </a:solidFill>
+            <a:tailEnd type="triangle"/>
+          </a:ln>
+        </p:spPr>
+        <p:style>
+          <a:lnRef idx="1">
+            <a:schemeClr val="accent1"/>
+          </a:lnRef>
+          <a:fillRef idx="0">
+            <a:schemeClr val="accent1"/>
+          </a:fillRef>
+          <a:effectRef idx="0">
+            <a:schemeClr val="accent1"/>
+          </a:effectRef>
+          <a:fontRef idx="minor">
+            <a:schemeClr val="tx1"/>
+          </a:fontRef>
+        </p:style>
+      </p:cxnSp>
+      <p:sp>
+        <p:nvSpPr>
+          <p:cNvPr id="29" name="TextBox 28">
+            <a:extLst>
+              <a:ext uri="{FF2B5EF4-FFF2-40B4-BE49-F238E27FC236}">
+                <a16:creationId xmlns:a16="http://schemas.microsoft.com/office/drawing/2014/main" id="{986ED349-5483-824B-827B-D77AC59E0C0E}"/>
+              </a:ext>
+            </a:extLst>
+          </p:cNvPr>
+          <p:cNvSpPr txBox="1"/>
+          <p:nvPr/>
+        </p:nvSpPr>
+        <p:spPr>
+          <a:xfrm>
+            <a:off x="3336257" y="2438411"/>
+            <a:ext cx="301686" cy="369332"/>
+          </a:xfrm>
+          <a:prstGeom prst="rect">
+            <a:avLst/>
+          </a:prstGeom>
+          <a:noFill/>
+        </p:spPr>
+        <p:txBody>
+          <a:bodyPr wrap="none" rtlCol="0">
+            <a:spAutoFit/>
+          </a:bodyPr>
+          <a:lstStyle/>
+          <a:p>
+            <a:r>
+              <a:rPr lang="en-US" dirty="0"/>
+              <a:t>0</a:t>
+            </a:r>
+          </a:p>
+        </p:txBody>
+      </p:sp>
+      <p:sp>
+        <p:nvSpPr>
+          <p:cNvPr id="30" name="TextBox 29">
+            <a:extLst>
+              <a:ext uri="{FF2B5EF4-FFF2-40B4-BE49-F238E27FC236}">
+                <a16:creationId xmlns:a16="http://schemas.microsoft.com/office/drawing/2014/main" id="{91C08EBE-D86B-514E-ABBD-4C722316AEAC}"/>
+              </a:ext>
+            </a:extLst>
+          </p:cNvPr>
+          <p:cNvSpPr txBox="1"/>
+          <p:nvPr/>
+        </p:nvSpPr>
+        <p:spPr>
+          <a:xfrm>
+            <a:off x="3336257" y="3692601"/>
+            <a:ext cx="301686" cy="369332"/>
+          </a:xfrm>
+          <a:prstGeom prst="rect">
+            <a:avLst/>
+          </a:prstGeom>
+          <a:noFill/>
+        </p:spPr>
+        <p:txBody>
+          <a:bodyPr wrap="none" rtlCol="0">
+            <a:spAutoFit/>
+          </a:bodyPr>
+          <a:lstStyle/>
+          <a:p>
+            <a:r>
+              <a:rPr lang="en-US" dirty="0"/>
+              <a:t>1</a:t>
+            </a:r>
+          </a:p>
+        </p:txBody>
+      </p:sp>
+      <p:sp>
+        <p:nvSpPr>
+          <p:cNvPr id="31" name="TextBox 30">
+            <a:extLst>
+              <a:ext uri="{FF2B5EF4-FFF2-40B4-BE49-F238E27FC236}">
+                <a16:creationId xmlns:a16="http://schemas.microsoft.com/office/drawing/2014/main" id="{1579F737-E36A-CF4F-A71B-F61FA633B83B}"/>
+              </a:ext>
+            </a:extLst>
+          </p:cNvPr>
+          <p:cNvSpPr txBox="1"/>
+          <p:nvPr/>
+        </p:nvSpPr>
+        <p:spPr>
+          <a:xfrm>
+            <a:off x="7077548" y="3623006"/>
+            <a:ext cx="301686" cy="369332"/>
+          </a:xfrm>
+          <a:prstGeom prst="rect">
+            <a:avLst/>
+          </a:prstGeom>
+          <a:noFill/>
+        </p:spPr>
+        <p:txBody>
+          <a:bodyPr wrap="none" rtlCol="0">
+            <a:spAutoFit/>
+          </a:bodyPr>
+          <a:lstStyle/>
+          <a:p>
+            <a:r>
+              <a:rPr lang="en-US" dirty="0"/>
+              <a:t>0</a:t>
+            </a:r>
+          </a:p>
+        </p:txBody>
+      </p:sp>
+      <p:sp>
+        <p:nvSpPr>
+          <p:cNvPr id="32" name="TextBox 31">
+            <a:extLst>
+              <a:ext uri="{FF2B5EF4-FFF2-40B4-BE49-F238E27FC236}">
+                <a16:creationId xmlns:a16="http://schemas.microsoft.com/office/drawing/2014/main" id="{73203684-EE7C-A44D-AB19-CDCA5E52B0BA}"/>
+              </a:ext>
+            </a:extLst>
+          </p:cNvPr>
+          <p:cNvSpPr txBox="1"/>
+          <p:nvPr/>
+        </p:nvSpPr>
+        <p:spPr>
+          <a:xfrm>
+            <a:off x="7077548" y="4638811"/>
+            <a:ext cx="301686" cy="369332"/>
+          </a:xfrm>
+          <a:prstGeom prst="rect">
+            <a:avLst/>
+          </a:prstGeom>
+          <a:noFill/>
+        </p:spPr>
+        <p:txBody>
+          <a:bodyPr wrap="none" rtlCol="0">
+            <a:spAutoFit/>
+          </a:bodyPr>
+          <a:lstStyle/>
+          <a:p>
+            <a:r>
+              <a:rPr lang="en-US" dirty="0"/>
+              <a:t>1</a:t>
+            </a:r>
+          </a:p>
+        </p:txBody>
+      </p:sp>
+      <p:sp>
+        <p:nvSpPr>
+          <p:cNvPr id="33" name="TextBox 32">
+            <a:extLst>
+              <a:ext uri="{FF2B5EF4-FFF2-40B4-BE49-F238E27FC236}">
+                <a16:creationId xmlns:a16="http://schemas.microsoft.com/office/drawing/2014/main" id="{476A1585-8FF6-3743-94B3-1CE5EF4AB2B1}"/>
+              </a:ext>
+            </a:extLst>
+          </p:cNvPr>
+          <p:cNvSpPr txBox="1"/>
+          <p:nvPr/>
+        </p:nvSpPr>
+        <p:spPr>
+          <a:xfrm>
+            <a:off x="2965622" y="1124465"/>
+            <a:ext cx="766877" cy="646331"/>
+          </a:xfrm>
+          <a:prstGeom prst="rect">
+            <a:avLst/>
+          </a:prstGeom>
+          <a:noFill/>
+        </p:spPr>
+        <p:txBody>
+          <a:bodyPr wrap="none" rtlCol="0">
+            <a:spAutoFit/>
+          </a:bodyPr>
+          <a:lstStyle/>
+          <a:p>
+            <a:pPr algn="ctr"/>
+            <a:r>
+              <a:rPr lang="en-US" dirty="0"/>
+              <a:t>Digest</a:t>
+            </a:r>
+          </a:p>
+          <a:p>
+            <a:pPr algn="ctr"/>
+            <a:r>
+              <a:rPr lang="en-US" dirty="0"/>
+              <a:t>Bit 0</a:t>
+            </a:r>
+          </a:p>
+        </p:txBody>
+      </p:sp>
+      <p:sp>
+        <p:nvSpPr>
+          <p:cNvPr id="34" name="TextBox 33">
+            <a:extLst>
+              <a:ext uri="{FF2B5EF4-FFF2-40B4-BE49-F238E27FC236}">
+                <a16:creationId xmlns:a16="http://schemas.microsoft.com/office/drawing/2014/main" id="{9170441C-D720-1B41-B2D0-BCF74FC13930}"/>
+              </a:ext>
+            </a:extLst>
+          </p:cNvPr>
+          <p:cNvSpPr txBox="1"/>
+          <p:nvPr/>
+        </p:nvSpPr>
+        <p:spPr>
+          <a:xfrm>
+            <a:off x="7077548" y="478134"/>
+            <a:ext cx="766877" cy="646331"/>
+          </a:xfrm>
+          <a:prstGeom prst="rect">
+            <a:avLst/>
+          </a:prstGeom>
+          <a:noFill/>
+        </p:spPr>
+        <p:txBody>
+          <a:bodyPr wrap="none" rtlCol="0">
+            <a:spAutoFit/>
+          </a:bodyPr>
+          <a:lstStyle/>
+          <a:p>
+            <a:pPr algn="ctr"/>
+            <a:r>
+              <a:rPr lang="en-US" dirty="0"/>
+              <a:t>Digest</a:t>
+            </a:r>
+          </a:p>
+          <a:p>
+            <a:pPr algn="ctr"/>
+            <a:r>
+              <a:rPr lang="en-US" dirty="0"/>
+              <a:t>Bit 1</a:t>
+            </a:r>
+          </a:p>
+        </p:txBody>
+      </p:sp>
+    </p:spTree>
+    <p:extLst>
+      <p:ext uri="{BB962C8B-B14F-4D97-AF65-F5344CB8AC3E}">
+        <p14:creationId xmlns:p14="http://schemas.microsoft.com/office/powerpoint/2010/main" val="2488403099"/>
+      </p:ext>
+    </p:extLst>
+  </p:cSld>
+  <p:clrMapOvr>
+    <a:masterClrMapping/>
+  </p:clrMapOvr>
+</p:sld>
+</file>
+
+<file path=ppt/slides/slide3.xml><?xml version="1.0" encoding="utf-8"?>
+<p:sld xmlns:a="http://schemas.openxmlformats.org/drawingml/2006/main" xmlns:r="http://schemas.openxmlformats.org/officeDocument/2006/relationships" xmlns:p="http://schemas.openxmlformats.org/presentationml/2006/main">
+  <p:cSld>
+    <p:spTree>
+      <p:nvGrpSpPr>
+        <p:cNvPr id="1" name=""/>
+        <p:cNvGrpSpPr/>
+        <p:nvPr/>
+      </p:nvGrpSpPr>
+      <p:grpSpPr>
+        <a:xfrm>
+          <a:off x="0" y="0"/>
+          <a:ext cx="0" cy="0"/>
+          <a:chOff x="0" y="0"/>
+          <a:chExt cx="0" cy="0"/>
+        </a:xfrm>
+      </p:grpSpPr>
+      <p:grpSp>
+        <p:nvGrpSpPr>
+          <p:cNvPr id="6" name="Group 5">
+            <a:extLst>
+              <a:ext uri="{FF2B5EF4-FFF2-40B4-BE49-F238E27FC236}">
+                <a16:creationId xmlns:a16="http://schemas.microsoft.com/office/drawing/2014/main" id="{FB2612DD-A76A-6446-8AA5-E9B72669B377}"/>
+              </a:ext>
+            </a:extLst>
+          </p:cNvPr>
+          <p:cNvGrpSpPr/>
+          <p:nvPr/>
+        </p:nvGrpSpPr>
+        <p:grpSpPr>
+          <a:xfrm>
+            <a:off x="391385" y="2892382"/>
+            <a:ext cx="2663687" cy="615553"/>
+            <a:chOff x="1083364" y="475494"/>
+            <a:chExt cx="2663687" cy="615553"/>
+          </a:xfrm>
+        </p:grpSpPr>
+        <p:sp>
+          <p:nvSpPr>
+            <p:cNvPr id="4" name="TextBox 3">
+              <a:extLst>
+                <a:ext uri="{FF2B5EF4-FFF2-40B4-BE49-F238E27FC236}">
+                  <a16:creationId xmlns:a16="http://schemas.microsoft.com/office/drawing/2014/main" id="{DEE2DC9A-5A65-0647-9436-0FB2B3A745DE}"/>
+                </a:ext>
+              </a:extLst>
+            </p:cNvPr>
+            <p:cNvSpPr txBox="1"/>
+            <p:nvPr/>
+          </p:nvSpPr>
+          <p:spPr>
+            <a:xfrm>
+              <a:off x="1083364" y="844826"/>
+              <a:ext cx="2663687" cy="246221"/>
+            </a:xfrm>
+            <a:prstGeom prst="rect">
+              <a:avLst/>
+            </a:prstGeom>
+            <a:noFill/>
+            <a:ln>
+              <a:solidFill>
+                <a:schemeClr val="tx1"/>
+              </a:solidFill>
+            </a:ln>
+          </p:spPr>
+          <p:txBody>
+            <a:bodyPr wrap="square" rtlCol="0">
+              <a:spAutoFit/>
+            </a:bodyPr>
+            <a:lstStyle/>
+            <a:p>
+              <a:r>
+                <a:rPr lang="en-US" sz="1000" dirty="0"/>
+                <a:t>Bitmap: 0000 0101</a:t>
+              </a:r>
+            </a:p>
+          </p:txBody>
+        </p:sp>
+        <p:sp>
+          <p:nvSpPr>
+            <p:cNvPr id="5" name="TextBox 4">
+              <a:extLst>
+                <a:ext uri="{FF2B5EF4-FFF2-40B4-BE49-F238E27FC236}">
+                  <a16:creationId xmlns:a16="http://schemas.microsoft.com/office/drawing/2014/main" id="{FAA13739-42E4-2046-A079-7E5B1A3BD4E4}"/>
+                </a:ext>
+              </a:extLst>
+            </p:cNvPr>
+            <p:cNvSpPr txBox="1"/>
+            <p:nvPr/>
+          </p:nvSpPr>
+          <p:spPr>
+            <a:xfrm>
+              <a:off x="1083364" y="475494"/>
+              <a:ext cx="2663687" cy="369332"/>
+            </a:xfrm>
+            <a:prstGeom prst="rect">
+              <a:avLst/>
+            </a:prstGeom>
+            <a:noFill/>
+            <a:ln>
+              <a:solidFill>
+                <a:schemeClr val="tx1"/>
+              </a:solidFill>
+            </a:ln>
+          </p:spPr>
+          <p:txBody>
+            <a:bodyPr wrap="square" rtlCol="0">
+              <a:spAutoFit/>
+            </a:bodyPr>
+            <a:lstStyle/>
+            <a:p>
+              <a:r>
+                <a:rPr lang="en-US" i="1" dirty="0"/>
+                <a:t>&lt;</a:t>
+              </a:r>
+              <a:r>
+                <a:rPr lang="en-US" i="1" dirty="0" err="1"/>
+                <a:t>Cust_id</a:t>
+              </a:r>
+              <a:r>
+                <a:rPr lang="en-US" i="1" dirty="0"/>
+                <a:t>&gt;:&lt;date&gt;</a:t>
+              </a:r>
+            </a:p>
+          </p:txBody>
+        </p:sp>
+      </p:grpSp>
+      <p:grpSp>
+        <p:nvGrpSpPr>
+          <p:cNvPr id="7" name="Group 6">
+            <a:extLst>
+              <a:ext uri="{FF2B5EF4-FFF2-40B4-BE49-F238E27FC236}">
+                <a16:creationId xmlns:a16="http://schemas.microsoft.com/office/drawing/2014/main" id="{E56B8153-EF17-134B-B729-3DAAAB2CA5AF}"/>
+              </a:ext>
+            </a:extLst>
+          </p:cNvPr>
+          <p:cNvGrpSpPr/>
+          <p:nvPr/>
+        </p:nvGrpSpPr>
+        <p:grpSpPr>
+          <a:xfrm>
+            <a:off x="4220815" y="1815164"/>
+            <a:ext cx="2663687" cy="1384995"/>
+            <a:chOff x="1083364" y="475494"/>
+            <a:chExt cx="2663687" cy="1384995"/>
+          </a:xfrm>
+        </p:grpSpPr>
+        <p:sp>
+          <p:nvSpPr>
+            <p:cNvPr id="8" name="TextBox 7">
+              <a:extLst>
+                <a:ext uri="{FF2B5EF4-FFF2-40B4-BE49-F238E27FC236}">
+                  <a16:creationId xmlns:a16="http://schemas.microsoft.com/office/drawing/2014/main" id="{060C17B8-1464-FA47-A346-3BE87B181C50}"/>
+                </a:ext>
+              </a:extLst>
+            </p:cNvPr>
+            <p:cNvSpPr txBox="1"/>
+            <p:nvPr/>
+          </p:nvSpPr>
+          <p:spPr>
+            <a:xfrm>
+              <a:off x="1083364" y="844826"/>
+              <a:ext cx="2663687" cy="1015663"/>
+            </a:xfrm>
+            <a:prstGeom prst="rect">
+              <a:avLst/>
+            </a:prstGeom>
+            <a:noFill/>
+            <a:ln>
+              <a:solidFill>
+                <a:schemeClr val="tx1"/>
+              </a:solidFill>
+            </a:ln>
+          </p:spPr>
+          <p:txBody>
+            <a:bodyPr wrap="square" rtlCol="0">
+              <a:spAutoFit/>
+            </a:bodyPr>
+            <a:lstStyle/>
+            <a:p>
+              <a:r>
+                <a:rPr lang="en-US" sz="1000" dirty="0"/>
+                <a:t>{</a:t>
+              </a:r>
+            </a:p>
+            <a:p>
+              <a:r>
+                <a:rPr lang="en-US" sz="1000" dirty="0"/>
+                <a:t>    txn2 -&gt; { Bob Record } Digest: 1011 0010</a:t>
+              </a:r>
+            </a:p>
+            <a:p>
+              <a:r>
+                <a:rPr lang="en-US" sz="1000" dirty="0"/>
+                <a:t>    txn5 -&gt; { Art Record } Digest: 1110 1000</a:t>
+              </a:r>
+            </a:p>
+            <a:p>
+              <a:r>
+                <a:rPr lang="en-US" sz="1000" dirty="0"/>
+                <a:t>    txn8 -&gt; { Don Record } Digest: 0110 0100</a:t>
+              </a:r>
+            </a:p>
+            <a:p>
+              <a:r>
+                <a:rPr lang="en-US" sz="1000" dirty="0"/>
+                <a:t>    txn10 -&gt; { Sam Record } Digest: 0010 0000</a:t>
+              </a:r>
+            </a:p>
+            <a:p>
+              <a:r>
+                <a:rPr lang="en-US" sz="1000" dirty="0"/>
+                <a:t>}</a:t>
+              </a:r>
+            </a:p>
+          </p:txBody>
+        </p:sp>
+        <p:sp>
+          <p:nvSpPr>
+            <p:cNvPr id="9" name="TextBox 8">
+              <a:extLst>
+                <a:ext uri="{FF2B5EF4-FFF2-40B4-BE49-F238E27FC236}">
+                  <a16:creationId xmlns:a16="http://schemas.microsoft.com/office/drawing/2014/main" id="{7F28AA47-26F7-DB45-B1AE-2A316FDA309B}"/>
+                </a:ext>
+              </a:extLst>
+            </p:cNvPr>
+            <p:cNvSpPr txBox="1"/>
+            <p:nvPr/>
+          </p:nvSpPr>
+          <p:spPr>
+            <a:xfrm>
+              <a:off x="1083364" y="475494"/>
+              <a:ext cx="2663687" cy="369332"/>
+            </a:xfrm>
+            <a:prstGeom prst="rect">
+              <a:avLst/>
+            </a:prstGeom>
+            <a:noFill/>
+            <a:ln>
+              <a:solidFill>
+                <a:schemeClr val="tx1"/>
+              </a:solidFill>
+            </a:ln>
+          </p:spPr>
+          <p:txBody>
+            <a:bodyPr wrap="square" rtlCol="0">
+              <a:spAutoFit/>
+            </a:bodyPr>
+            <a:lstStyle/>
+            <a:p>
+              <a:r>
+                <a:rPr lang="en-US" i="1" dirty="0"/>
+                <a:t>&lt;</a:t>
+              </a:r>
+              <a:r>
+                <a:rPr lang="en-US" i="1" dirty="0" err="1"/>
+                <a:t>Cust_id</a:t>
+              </a:r>
+              <a:r>
+                <a:rPr lang="en-US" i="1" dirty="0"/>
+                <a:t>&gt;:&lt;date&gt; :1</a:t>
+              </a:r>
+            </a:p>
+          </p:txBody>
+        </p:sp>
+      </p:grpSp>
+      <p:grpSp>
+        <p:nvGrpSpPr>
+          <p:cNvPr id="10" name="Group 9">
+            <a:extLst>
+              <a:ext uri="{FF2B5EF4-FFF2-40B4-BE49-F238E27FC236}">
+                <a16:creationId xmlns:a16="http://schemas.microsoft.com/office/drawing/2014/main" id="{7F221EAD-578E-D344-A706-BF36D327B3CA}"/>
+              </a:ext>
+            </a:extLst>
+          </p:cNvPr>
+          <p:cNvGrpSpPr/>
+          <p:nvPr/>
+        </p:nvGrpSpPr>
+        <p:grpSpPr>
+          <a:xfrm>
+            <a:off x="4230218" y="3486424"/>
+            <a:ext cx="2663687" cy="1231106"/>
+            <a:chOff x="1083364" y="475494"/>
+            <a:chExt cx="2663687" cy="1231106"/>
+          </a:xfrm>
+        </p:grpSpPr>
+        <p:sp>
+          <p:nvSpPr>
+            <p:cNvPr id="11" name="TextBox 10">
+              <a:extLst>
+                <a:ext uri="{FF2B5EF4-FFF2-40B4-BE49-F238E27FC236}">
+                  <a16:creationId xmlns:a16="http://schemas.microsoft.com/office/drawing/2014/main" id="{9F214698-0C7B-A44F-B198-7377313A3A64}"/>
+                </a:ext>
+              </a:extLst>
+            </p:cNvPr>
+            <p:cNvSpPr txBox="1"/>
+            <p:nvPr/>
+          </p:nvSpPr>
+          <p:spPr>
+            <a:xfrm>
+              <a:off x="1083364" y="844826"/>
+              <a:ext cx="2663687" cy="861774"/>
+            </a:xfrm>
+            <a:prstGeom prst="rect">
+              <a:avLst/>
+            </a:prstGeom>
+            <a:noFill/>
+            <a:ln>
+              <a:solidFill>
+                <a:schemeClr val="tx1"/>
+              </a:solidFill>
+              <a:prstDash val="sysDash"/>
+            </a:ln>
+          </p:spPr>
+          <p:txBody>
+            <a:bodyPr wrap="square" rtlCol="0">
+              <a:spAutoFit/>
+            </a:bodyPr>
+            <a:lstStyle/>
+            <a:p>
+              <a:r>
+                <a:rPr lang="en-US" sz="1000" dirty="0">
+                  <a:solidFill>
+                    <a:schemeClr val="bg1">
+                      <a:lumMod val="85000"/>
+                    </a:schemeClr>
+                  </a:solidFill>
+                </a:rPr>
+                <a:t>{</a:t>
+              </a:r>
+            </a:p>
+            <a:p>
+              <a:r>
+                <a:rPr lang="en-US" sz="1000" dirty="0">
+                  <a:solidFill>
+                    <a:schemeClr val="bg1">
+                      <a:lumMod val="85000"/>
+                    </a:schemeClr>
+                  </a:solidFill>
+                </a:rPr>
+                <a:t>    1. Tim -&gt; { Tim Record } Digest: 1111 0001</a:t>
+              </a:r>
+            </a:p>
+            <a:p>
+              <a:r>
+                <a:rPr lang="en-US" sz="1000" dirty="0">
+                  <a:solidFill>
+                    <a:schemeClr val="bg1">
+                      <a:lumMod val="85000"/>
+                    </a:schemeClr>
+                  </a:solidFill>
+                </a:rPr>
+                <a:t>    3. Sue -&gt; { Sue Record } Digest: 1001 0011</a:t>
+              </a:r>
+            </a:p>
+            <a:p>
+              <a:r>
+                <a:rPr lang="en-US" sz="1000" dirty="0">
+                  <a:solidFill>
+                    <a:schemeClr val="bg1">
+                      <a:lumMod val="85000"/>
+                    </a:schemeClr>
+                  </a:solidFill>
+                </a:rPr>
+                <a:t>    4. Tom -&gt; { Tom Record } Digest: 0100 0011</a:t>
+              </a:r>
+            </a:p>
+            <a:p>
+              <a:r>
+                <a:rPr lang="en-US" sz="1000" dirty="0">
+                  <a:solidFill>
+                    <a:schemeClr val="bg1">
+                      <a:lumMod val="85000"/>
+                    </a:schemeClr>
+                  </a:solidFill>
+                </a:rPr>
+                <a:t>}</a:t>
+              </a:r>
+            </a:p>
+          </p:txBody>
+        </p:sp>
+        <p:sp>
+          <p:nvSpPr>
+            <p:cNvPr id="12" name="TextBox 11">
+              <a:extLst>
+                <a:ext uri="{FF2B5EF4-FFF2-40B4-BE49-F238E27FC236}">
+                  <a16:creationId xmlns:a16="http://schemas.microsoft.com/office/drawing/2014/main" id="{53F655BD-8EEF-2A47-B957-821F84D220AE}"/>
+                </a:ext>
+              </a:extLst>
+            </p:cNvPr>
+            <p:cNvSpPr txBox="1"/>
+            <p:nvPr/>
+          </p:nvSpPr>
+          <p:spPr>
+            <a:xfrm>
+              <a:off x="1083364" y="475494"/>
+              <a:ext cx="2663687" cy="369332"/>
+            </a:xfrm>
+            <a:prstGeom prst="rect">
+              <a:avLst/>
+            </a:prstGeom>
+            <a:noFill/>
+            <a:ln>
+              <a:solidFill>
+                <a:schemeClr val="tx1"/>
+              </a:solidFill>
+              <a:prstDash val="sysDash"/>
+            </a:ln>
+          </p:spPr>
+          <p:txBody>
+            <a:bodyPr wrap="square" rtlCol="0">
+              <a:spAutoFit/>
+            </a:bodyPr>
+            <a:lstStyle/>
+            <a:p>
+              <a:r>
+                <a:rPr lang="en-US" i="1" dirty="0">
+                  <a:solidFill>
+                    <a:schemeClr val="bg1">
+                      <a:lumMod val="85000"/>
+                    </a:schemeClr>
+                  </a:solidFill>
+                </a:rPr>
+                <a:t>TestKey:2</a:t>
+              </a:r>
+            </a:p>
+          </p:txBody>
+        </p:sp>
+      </p:grpSp>
+      <p:cxnSp>
+        <p:nvCxnSpPr>
+          <p:cNvPr id="14" name="Elbow Connector 13">
+            <a:extLst>
+              <a:ext uri="{FF2B5EF4-FFF2-40B4-BE49-F238E27FC236}">
+                <a16:creationId xmlns:a16="http://schemas.microsoft.com/office/drawing/2014/main" id="{ACF1419A-B621-5140-8275-76991069C10A}"/>
+              </a:ext>
+            </a:extLst>
+          </p:cNvPr>
+          <p:cNvCxnSpPr>
+            <a:stCxn id="4" idx="3"/>
+            <a:endCxn id="11" idx="1"/>
+          </p:cNvCxnSpPr>
+          <p:nvPr/>
+        </p:nvCxnSpPr>
+        <p:spPr>
+          <a:xfrm>
+            <a:off x="3055072" y="3384825"/>
+            <a:ext cx="1175146" cy="901818"/>
+          </a:xfrm>
+          <a:prstGeom prst="curvedConnector3">
+            <a:avLst/>
+          </a:prstGeom>
+          <a:ln>
+            <a:solidFill>
+              <a:schemeClr val="tx1"/>
+            </a:solidFill>
+            <a:tailEnd type="triangle"/>
+          </a:ln>
+        </p:spPr>
+        <p:style>
+          <a:lnRef idx="1">
+            <a:schemeClr val="accent1"/>
+          </a:lnRef>
+          <a:fillRef idx="0">
+            <a:schemeClr val="accent1"/>
+          </a:fillRef>
+          <a:effectRef idx="0">
+            <a:schemeClr val="accent1"/>
+          </a:effectRef>
+          <a:fontRef idx="minor">
+            <a:schemeClr val="tx1"/>
+          </a:fontRef>
+        </p:style>
+      </p:cxnSp>
+      <p:cxnSp>
+        <p:nvCxnSpPr>
+          <p:cNvPr id="15" name="Elbow Connector 13">
+            <a:extLst>
+              <a:ext uri="{FF2B5EF4-FFF2-40B4-BE49-F238E27FC236}">
+                <a16:creationId xmlns:a16="http://schemas.microsoft.com/office/drawing/2014/main" id="{98E4ADF3-1A6D-3844-AD22-1F2E2E697A44}"/>
+              </a:ext>
+            </a:extLst>
+          </p:cNvPr>
+          <p:cNvCxnSpPr>
+            <a:cxnSpLocks/>
+            <a:stCxn id="5" idx="3"/>
+            <a:endCxn id="8" idx="1"/>
+          </p:cNvCxnSpPr>
+          <p:nvPr/>
+        </p:nvCxnSpPr>
+        <p:spPr>
+          <a:xfrm flipV="1">
+            <a:off x="3055072" y="2692328"/>
+            <a:ext cx="1165743" cy="384720"/>
+          </a:xfrm>
+          <a:prstGeom prst="curvedConnector3">
+            <a:avLst>
+              <a:gd name="adj1" fmla="val 50000"/>
+            </a:avLst>
+          </a:prstGeom>
+          <a:ln>
+            <a:solidFill>
+              <a:schemeClr val="tx1"/>
+            </a:solidFill>
+            <a:tailEnd type="triangle"/>
+          </a:ln>
+        </p:spPr>
+        <p:style>
+          <a:lnRef idx="1">
+            <a:schemeClr val="accent1"/>
+          </a:lnRef>
+          <a:fillRef idx="0">
+            <a:schemeClr val="accent1"/>
+          </a:fillRef>
+          <a:effectRef idx="0">
+            <a:schemeClr val="accent1"/>
+          </a:effectRef>
+          <a:fontRef idx="minor">
+            <a:schemeClr val="tx1"/>
+          </a:fontRef>
+        </p:style>
+      </p:cxnSp>
+      <p:grpSp>
+        <p:nvGrpSpPr>
+          <p:cNvPr id="18" name="Group 17">
+            <a:extLst>
+              <a:ext uri="{FF2B5EF4-FFF2-40B4-BE49-F238E27FC236}">
+                <a16:creationId xmlns:a16="http://schemas.microsoft.com/office/drawing/2014/main" id="{57A85072-46B8-E648-82EC-94B28AFE1842}"/>
+              </a:ext>
+            </a:extLst>
+          </p:cNvPr>
+          <p:cNvGrpSpPr/>
+          <p:nvPr/>
+        </p:nvGrpSpPr>
+        <p:grpSpPr>
+          <a:xfrm>
+            <a:off x="7961784" y="2892382"/>
+            <a:ext cx="2663687" cy="1231106"/>
+            <a:chOff x="1083364" y="475494"/>
+            <a:chExt cx="2663687" cy="1231106"/>
+          </a:xfrm>
+        </p:grpSpPr>
+        <p:sp>
+          <p:nvSpPr>
+            <p:cNvPr id="19" name="TextBox 18">
+              <a:extLst>
+                <a:ext uri="{FF2B5EF4-FFF2-40B4-BE49-F238E27FC236}">
+                  <a16:creationId xmlns:a16="http://schemas.microsoft.com/office/drawing/2014/main" id="{AF64A7AB-AE82-BF49-B9D2-2561DB813DF4}"/>
+                </a:ext>
+              </a:extLst>
+            </p:cNvPr>
+            <p:cNvSpPr txBox="1"/>
+            <p:nvPr/>
+          </p:nvSpPr>
+          <p:spPr>
+            <a:xfrm>
+              <a:off x="1083364" y="844826"/>
+              <a:ext cx="2663687" cy="861774"/>
+            </a:xfrm>
+            <a:prstGeom prst="rect">
+              <a:avLst/>
+            </a:prstGeom>
+            <a:noFill/>
+            <a:ln>
+              <a:solidFill>
+                <a:schemeClr val="tx1"/>
+              </a:solidFill>
+            </a:ln>
+          </p:spPr>
+          <p:txBody>
+            <a:bodyPr wrap="square" rtlCol="0">
+              <a:spAutoFit/>
+            </a:bodyPr>
+            <a:lstStyle/>
+            <a:p>
+              <a:r>
+                <a:rPr lang="en-US" sz="1000" dirty="0"/>
+                <a:t>{</a:t>
+              </a:r>
+            </a:p>
+            <a:p>
+              <a:r>
+                <a:rPr lang="en-US" sz="1000" dirty="0"/>
+                <a:t>    txn1 -&gt; { Tim Record } Digest: 1111 0001</a:t>
+              </a:r>
+            </a:p>
+            <a:p>
+              <a:r>
+                <a:rPr lang="en-US" sz="1000" dirty="0"/>
+                <a:t>    txn6 -&gt; { Aya Record } Digest: 1010 1001</a:t>
+              </a:r>
+            </a:p>
+            <a:p>
+              <a:r>
+                <a:rPr lang="en-US" sz="1000" dirty="0"/>
+                <a:t>    txn9 -&gt; { Jim Record } Digest: 0110 0101</a:t>
+              </a:r>
+            </a:p>
+            <a:p>
+              <a:r>
+                <a:rPr lang="en-US" sz="1000" dirty="0"/>
+                <a:t>}</a:t>
+              </a:r>
+            </a:p>
+          </p:txBody>
+        </p:sp>
+        <p:sp>
+          <p:nvSpPr>
+            <p:cNvPr id="20" name="TextBox 19">
+              <a:extLst>
+                <a:ext uri="{FF2B5EF4-FFF2-40B4-BE49-F238E27FC236}">
+                  <a16:creationId xmlns:a16="http://schemas.microsoft.com/office/drawing/2014/main" id="{0FEABD17-3411-E446-B432-E5EC782AAA05}"/>
+                </a:ext>
+              </a:extLst>
+            </p:cNvPr>
+            <p:cNvSpPr txBox="1"/>
+            <p:nvPr/>
+          </p:nvSpPr>
+          <p:spPr>
+            <a:xfrm>
+              <a:off x="1083364" y="475494"/>
+              <a:ext cx="2663687" cy="369332"/>
+            </a:xfrm>
+            <a:prstGeom prst="rect">
+              <a:avLst/>
+            </a:prstGeom>
+            <a:noFill/>
+            <a:ln>
+              <a:solidFill>
+                <a:schemeClr val="tx1"/>
+              </a:solidFill>
+            </a:ln>
+          </p:spPr>
+          <p:txBody>
+            <a:bodyPr wrap="square" rtlCol="0">
+              <a:spAutoFit/>
+            </a:bodyPr>
+            <a:lstStyle/>
+            <a:p>
+              <a:r>
+                <a:rPr lang="en-US" i="1" dirty="0"/>
+                <a:t>&lt;</a:t>
+              </a:r>
+              <a:r>
+                <a:rPr lang="en-US" i="1" dirty="0" err="1"/>
+                <a:t>Cust_id</a:t>
+              </a:r>
+              <a:r>
+                <a:rPr lang="en-US" i="1" dirty="0"/>
+                <a:t>&gt;:&lt;date&gt; :5</a:t>
+              </a:r>
+            </a:p>
+          </p:txBody>
+        </p:sp>
+      </p:grpSp>
+      <p:grpSp>
+        <p:nvGrpSpPr>
+          <p:cNvPr id="21" name="Group 20">
+            <a:extLst>
+              <a:ext uri="{FF2B5EF4-FFF2-40B4-BE49-F238E27FC236}">
+                <a16:creationId xmlns:a16="http://schemas.microsoft.com/office/drawing/2014/main" id="{F1081A49-BF85-9240-A4DE-793C118C0005}"/>
+              </a:ext>
+            </a:extLst>
+          </p:cNvPr>
+          <p:cNvGrpSpPr/>
+          <p:nvPr/>
+        </p:nvGrpSpPr>
+        <p:grpSpPr>
+          <a:xfrm>
+            <a:off x="7961785" y="4433328"/>
+            <a:ext cx="2663687" cy="1231106"/>
+            <a:chOff x="1083364" y="475494"/>
+            <a:chExt cx="2663687" cy="1231106"/>
+          </a:xfrm>
+        </p:grpSpPr>
+        <p:sp>
+          <p:nvSpPr>
+            <p:cNvPr id="22" name="TextBox 21">
+              <a:extLst>
+                <a:ext uri="{FF2B5EF4-FFF2-40B4-BE49-F238E27FC236}">
+                  <a16:creationId xmlns:a16="http://schemas.microsoft.com/office/drawing/2014/main" id="{A7FB7E0F-CCC2-ED45-8EAD-5EF74FF44A21}"/>
+                </a:ext>
+              </a:extLst>
+            </p:cNvPr>
+            <p:cNvSpPr txBox="1"/>
+            <p:nvPr/>
+          </p:nvSpPr>
+          <p:spPr>
+            <a:xfrm>
+              <a:off x="1083364" y="844826"/>
+              <a:ext cx="2663687" cy="861774"/>
+            </a:xfrm>
+            <a:prstGeom prst="rect">
+              <a:avLst/>
+            </a:prstGeom>
+            <a:noFill/>
+            <a:ln>
+              <a:solidFill>
+                <a:schemeClr val="tx1"/>
+              </a:solidFill>
+            </a:ln>
+          </p:spPr>
+          <p:txBody>
+            <a:bodyPr wrap="square" rtlCol="0">
+              <a:spAutoFit/>
+            </a:bodyPr>
+            <a:lstStyle/>
+            <a:p>
+              <a:r>
+                <a:rPr lang="en-US" sz="1000" dirty="0"/>
+                <a:t>{</a:t>
+              </a:r>
+            </a:p>
+            <a:p>
+              <a:r>
+                <a:rPr lang="en-US" sz="1000" dirty="0"/>
+                <a:t>    txn3 -&gt; { Sue Record } Digest: 1001 0011</a:t>
+              </a:r>
+            </a:p>
+            <a:p>
+              <a:r>
+                <a:rPr lang="en-US" sz="1000" dirty="0"/>
+                <a:t>    txn4 -&gt; { Tom Record } Digest: 0100 0011</a:t>
+              </a:r>
+            </a:p>
+            <a:p>
+              <a:r>
+                <a:rPr lang="en-US" sz="1000" dirty="0"/>
+                <a:t>    txn7 -&gt; { Joe Record } Digest: 1110 0011</a:t>
+              </a:r>
+            </a:p>
+            <a:p>
+              <a:r>
+                <a:rPr lang="en-US" sz="1000" dirty="0"/>
+                <a:t>}</a:t>
+              </a:r>
+            </a:p>
+          </p:txBody>
+        </p:sp>
+        <p:sp>
+          <p:nvSpPr>
+            <p:cNvPr id="23" name="TextBox 22">
+              <a:extLst>
+                <a:ext uri="{FF2B5EF4-FFF2-40B4-BE49-F238E27FC236}">
+                  <a16:creationId xmlns:a16="http://schemas.microsoft.com/office/drawing/2014/main" id="{18478A3B-9C72-2C41-84E0-CAD8452F3113}"/>
+                </a:ext>
+              </a:extLst>
+            </p:cNvPr>
+            <p:cNvSpPr txBox="1"/>
+            <p:nvPr/>
+          </p:nvSpPr>
+          <p:spPr>
+            <a:xfrm>
+              <a:off x="1083364" y="475494"/>
+              <a:ext cx="2663687" cy="369332"/>
+            </a:xfrm>
+            <a:prstGeom prst="rect">
+              <a:avLst/>
+            </a:prstGeom>
+            <a:noFill/>
+            <a:ln>
+              <a:solidFill>
+                <a:schemeClr val="tx1"/>
+              </a:solidFill>
+            </a:ln>
+          </p:spPr>
+          <p:txBody>
+            <a:bodyPr wrap="square" rtlCol="0">
+              <a:spAutoFit/>
+            </a:bodyPr>
+            <a:lstStyle/>
+            <a:p>
+              <a:r>
+                <a:rPr lang="en-US" i="1" dirty="0"/>
+                <a:t>&lt;</a:t>
+              </a:r>
+              <a:r>
+                <a:rPr lang="en-US" i="1" dirty="0" err="1"/>
+                <a:t>Cust_id</a:t>
+              </a:r>
+              <a:r>
+                <a:rPr lang="en-US" i="1" dirty="0"/>
+                <a:t>&gt;:&lt;date&gt; :6</a:t>
+              </a:r>
+            </a:p>
+          </p:txBody>
+        </p:sp>
+      </p:grpSp>
+      <p:cxnSp>
+        <p:nvCxnSpPr>
+          <p:cNvPr id="24" name="Elbow Connector 13">
+            <a:extLst>
+              <a:ext uri="{FF2B5EF4-FFF2-40B4-BE49-F238E27FC236}">
+                <a16:creationId xmlns:a16="http://schemas.microsoft.com/office/drawing/2014/main" id="{24E6D724-171B-8E4F-BAD5-BCFB4CEE7310}"/>
+              </a:ext>
+            </a:extLst>
+          </p:cNvPr>
+          <p:cNvCxnSpPr>
+            <a:cxnSpLocks/>
+            <a:endCxn id="22" idx="1"/>
+          </p:cNvCxnSpPr>
+          <p:nvPr/>
+        </p:nvCxnSpPr>
+        <p:spPr>
+          <a:xfrm>
+            <a:off x="6893905" y="4307463"/>
+            <a:ext cx="1067880" cy="926084"/>
+          </a:xfrm>
+          <a:prstGeom prst="curvedConnector3">
+            <a:avLst/>
+          </a:prstGeom>
+          <a:ln>
+            <a:solidFill>
+              <a:schemeClr val="tx1"/>
+            </a:solidFill>
+            <a:tailEnd type="triangle"/>
+          </a:ln>
+        </p:spPr>
+        <p:style>
+          <a:lnRef idx="1">
+            <a:schemeClr val="accent1"/>
+          </a:lnRef>
+          <a:fillRef idx="0">
+            <a:schemeClr val="accent1"/>
+          </a:fillRef>
+          <a:effectRef idx="0">
+            <a:schemeClr val="accent1"/>
+          </a:effectRef>
+          <a:fontRef idx="minor">
+            <a:schemeClr val="tx1"/>
+          </a:fontRef>
+        </p:style>
+      </p:cxnSp>
+      <p:cxnSp>
+        <p:nvCxnSpPr>
+          <p:cNvPr id="26" name="Elbow Connector 13">
+            <a:extLst>
+              <a:ext uri="{FF2B5EF4-FFF2-40B4-BE49-F238E27FC236}">
+                <a16:creationId xmlns:a16="http://schemas.microsoft.com/office/drawing/2014/main" id="{61328EF1-F7B4-7040-94FB-9E0A5AB3F4DD}"/>
+              </a:ext>
+            </a:extLst>
+          </p:cNvPr>
+          <p:cNvCxnSpPr>
+            <a:cxnSpLocks/>
+            <a:endCxn id="19" idx="1"/>
+          </p:cNvCxnSpPr>
+          <p:nvPr/>
+        </p:nvCxnSpPr>
+        <p:spPr>
+          <a:xfrm flipV="1">
+            <a:off x="6893905" y="3692601"/>
+            <a:ext cx="1067879" cy="353945"/>
+          </a:xfrm>
+          <a:prstGeom prst="curvedConnector3">
+            <a:avLst>
+              <a:gd name="adj1" fmla="val 50000"/>
+            </a:avLst>
+          </a:prstGeom>
+          <a:ln>
+            <a:solidFill>
+              <a:schemeClr val="tx1"/>
+            </a:solidFill>
+            <a:tailEnd type="triangle"/>
+          </a:ln>
+        </p:spPr>
+        <p:style>
+          <a:lnRef idx="1">
+            <a:schemeClr val="accent1"/>
+          </a:lnRef>
+          <a:fillRef idx="0">
+            <a:schemeClr val="accent1"/>
+          </a:fillRef>
+          <a:effectRef idx="0">
+            <a:schemeClr val="accent1"/>
+          </a:effectRef>
+          <a:fontRef idx="minor">
+            <a:schemeClr val="tx1"/>
+          </a:fontRef>
+        </p:style>
+      </p:cxnSp>
+      <p:sp>
+        <p:nvSpPr>
+          <p:cNvPr id="29" name="TextBox 28">
+            <a:extLst>
+              <a:ext uri="{FF2B5EF4-FFF2-40B4-BE49-F238E27FC236}">
+                <a16:creationId xmlns:a16="http://schemas.microsoft.com/office/drawing/2014/main" id="{986ED349-5483-824B-827B-D77AC59E0C0E}"/>
+              </a:ext>
+            </a:extLst>
+          </p:cNvPr>
+          <p:cNvSpPr txBox="1"/>
+          <p:nvPr/>
+        </p:nvSpPr>
+        <p:spPr>
+          <a:xfrm>
+            <a:off x="3336257" y="2438411"/>
+            <a:ext cx="301686" cy="369332"/>
+          </a:xfrm>
+          <a:prstGeom prst="rect">
+            <a:avLst/>
+          </a:prstGeom>
+          <a:noFill/>
+        </p:spPr>
+        <p:txBody>
+          <a:bodyPr wrap="none" rtlCol="0">
+            <a:spAutoFit/>
+          </a:bodyPr>
+          <a:lstStyle/>
+          <a:p>
+            <a:r>
+              <a:rPr lang="en-US" dirty="0"/>
+              <a:t>0</a:t>
+            </a:r>
+          </a:p>
+        </p:txBody>
+      </p:sp>
+      <p:sp>
+        <p:nvSpPr>
+          <p:cNvPr id="30" name="TextBox 29">
+            <a:extLst>
+              <a:ext uri="{FF2B5EF4-FFF2-40B4-BE49-F238E27FC236}">
+                <a16:creationId xmlns:a16="http://schemas.microsoft.com/office/drawing/2014/main" id="{91C08EBE-D86B-514E-ABBD-4C722316AEAC}"/>
+              </a:ext>
+            </a:extLst>
+          </p:cNvPr>
+          <p:cNvSpPr txBox="1"/>
+          <p:nvPr/>
+        </p:nvSpPr>
+        <p:spPr>
+          <a:xfrm>
+            <a:off x="3336257" y="3692601"/>
+            <a:ext cx="301686" cy="369332"/>
+          </a:xfrm>
+          <a:prstGeom prst="rect">
+            <a:avLst/>
+          </a:prstGeom>
+          <a:noFill/>
+        </p:spPr>
+        <p:txBody>
+          <a:bodyPr wrap="none" rtlCol="0">
+            <a:spAutoFit/>
+          </a:bodyPr>
+          <a:lstStyle/>
+          <a:p>
+            <a:r>
+              <a:rPr lang="en-US" dirty="0"/>
+              <a:t>1</a:t>
+            </a:r>
+          </a:p>
+        </p:txBody>
+      </p:sp>
+      <p:sp>
+        <p:nvSpPr>
+          <p:cNvPr id="31" name="TextBox 30">
+            <a:extLst>
+              <a:ext uri="{FF2B5EF4-FFF2-40B4-BE49-F238E27FC236}">
+                <a16:creationId xmlns:a16="http://schemas.microsoft.com/office/drawing/2014/main" id="{1579F737-E36A-CF4F-A71B-F61FA633B83B}"/>
+              </a:ext>
+            </a:extLst>
+          </p:cNvPr>
+          <p:cNvSpPr txBox="1"/>
+          <p:nvPr/>
+        </p:nvSpPr>
+        <p:spPr>
+          <a:xfrm>
+            <a:off x="7077548" y="3623006"/>
+            <a:ext cx="301686" cy="369332"/>
+          </a:xfrm>
+          <a:prstGeom prst="rect">
+            <a:avLst/>
+          </a:prstGeom>
+          <a:noFill/>
+        </p:spPr>
+        <p:txBody>
+          <a:bodyPr wrap="none" rtlCol="0">
+            <a:spAutoFit/>
+          </a:bodyPr>
+          <a:lstStyle/>
+          <a:p>
+            <a:r>
+              <a:rPr lang="en-US" dirty="0"/>
+              <a:t>0</a:t>
+            </a:r>
+          </a:p>
+        </p:txBody>
+      </p:sp>
+      <p:sp>
+        <p:nvSpPr>
+          <p:cNvPr id="32" name="TextBox 31">
+            <a:extLst>
+              <a:ext uri="{FF2B5EF4-FFF2-40B4-BE49-F238E27FC236}">
+                <a16:creationId xmlns:a16="http://schemas.microsoft.com/office/drawing/2014/main" id="{73203684-EE7C-A44D-AB19-CDCA5E52B0BA}"/>
+              </a:ext>
+            </a:extLst>
+          </p:cNvPr>
+          <p:cNvSpPr txBox="1"/>
+          <p:nvPr/>
+        </p:nvSpPr>
+        <p:spPr>
+          <a:xfrm>
+            <a:off x="7077548" y="4638811"/>
+            <a:ext cx="301686" cy="369332"/>
+          </a:xfrm>
+          <a:prstGeom prst="rect">
+            <a:avLst/>
+          </a:prstGeom>
+          <a:noFill/>
+        </p:spPr>
+        <p:txBody>
+          <a:bodyPr wrap="none" rtlCol="0">
+            <a:spAutoFit/>
+          </a:bodyPr>
+          <a:lstStyle/>
+          <a:p>
+            <a:r>
+              <a:rPr lang="en-US" dirty="0"/>
+              <a:t>1</a:t>
+            </a:r>
+          </a:p>
+        </p:txBody>
+      </p:sp>
+      <p:sp>
+        <p:nvSpPr>
+          <p:cNvPr id="33" name="TextBox 32">
+            <a:extLst>
+              <a:ext uri="{FF2B5EF4-FFF2-40B4-BE49-F238E27FC236}">
+                <a16:creationId xmlns:a16="http://schemas.microsoft.com/office/drawing/2014/main" id="{476A1585-8FF6-3743-94B3-1CE5EF4AB2B1}"/>
+              </a:ext>
+            </a:extLst>
+          </p:cNvPr>
+          <p:cNvSpPr txBox="1"/>
+          <p:nvPr/>
+        </p:nvSpPr>
+        <p:spPr>
+          <a:xfrm>
+            <a:off x="2965622" y="1124465"/>
+            <a:ext cx="766877" cy="646331"/>
+          </a:xfrm>
+          <a:prstGeom prst="rect">
+            <a:avLst/>
+          </a:prstGeom>
+          <a:noFill/>
+        </p:spPr>
+        <p:txBody>
+          <a:bodyPr wrap="none" rtlCol="0">
+            <a:spAutoFit/>
+          </a:bodyPr>
+          <a:lstStyle/>
+          <a:p>
+            <a:pPr algn="ctr"/>
+            <a:r>
+              <a:rPr lang="en-US" dirty="0"/>
+              <a:t>Digest</a:t>
+            </a:r>
+          </a:p>
+          <a:p>
+            <a:pPr algn="ctr"/>
+            <a:r>
+              <a:rPr lang="en-US" dirty="0"/>
+              <a:t>Bit 0</a:t>
+            </a:r>
+          </a:p>
+        </p:txBody>
+      </p:sp>
+      <p:sp>
+        <p:nvSpPr>
+          <p:cNvPr id="34" name="TextBox 33">
+            <a:extLst>
+              <a:ext uri="{FF2B5EF4-FFF2-40B4-BE49-F238E27FC236}">
+                <a16:creationId xmlns:a16="http://schemas.microsoft.com/office/drawing/2014/main" id="{9170441C-D720-1B41-B2D0-BCF74FC13930}"/>
+              </a:ext>
+            </a:extLst>
+          </p:cNvPr>
+          <p:cNvSpPr txBox="1"/>
+          <p:nvPr/>
+        </p:nvSpPr>
+        <p:spPr>
+          <a:xfrm>
+            <a:off x="7077548" y="478134"/>
+            <a:ext cx="766877" cy="646331"/>
+          </a:xfrm>
+          <a:prstGeom prst="rect">
+            <a:avLst/>
+          </a:prstGeom>
+          <a:noFill/>
+        </p:spPr>
+        <p:txBody>
+          <a:bodyPr wrap="none" rtlCol="0">
+            <a:spAutoFit/>
+          </a:bodyPr>
+          <a:lstStyle/>
+          <a:p>
+            <a:pPr algn="ctr"/>
+            <a:r>
+              <a:rPr lang="en-US" dirty="0"/>
+              <a:t>Digest</a:t>
+            </a:r>
+          </a:p>
+          <a:p>
+            <a:pPr algn="ctr"/>
+            <a:r>
+              <a:rPr lang="en-US" dirty="0"/>
+              <a:t>Bit 1</a:t>
+            </a:r>
+          </a:p>
+        </p:txBody>
+      </p:sp>
+    </p:spTree>
+    <p:extLst>
+      <p:ext uri="{BB962C8B-B14F-4D97-AF65-F5344CB8AC3E}">
+        <p14:creationId xmlns:p14="http://schemas.microsoft.com/office/powerpoint/2010/main" val="4076388657"/>
+      </p:ext>
+    </p:extLst>
+  </p:cSld>
+  <p:clrMapOvr>
+    <a:masterClrMapping/>
+  </p:clrMapOvr>
+</p:sld>
+</file>
+
 <file path=ppt/theme/theme1.xml><?xml version="1.0" encoding="utf-8"?>
 <a:theme xmlns:a="http://schemas.openxmlformats.org/drawingml/2006/main" name="Office Theme">
   <a:themeElements>

</xml_diff>